<commit_message>
bullet collision with map
</commit_message>
<xml_diff>
--- a/Documents/framework.pptx
+++ b/Documents/framework.pptx
@@ -9,6 +9,7 @@
     <p:sldId id="261" r:id="rId3"/>
     <p:sldId id="257" r:id="rId4"/>
     <p:sldId id="258" r:id="rId5"/>
+    <p:sldId id="262" r:id="rId6"/>
   </p:sldIdLst>
   <p:sldSz cx="12192000" cy="6858000"/>
   <p:notesSz cx="6858000" cy="9144000"/>
@@ -107,6 +108,11 @@
       </a:defRPr>
     </a:lvl9pPr>
   </p:defaultTextStyle>
+  <p:extLst>
+    <p:ext uri="{EFAFB233-063F-42B5-8137-9DF3F51BA10A}">
+      <p15:sldGuideLst xmlns:p15="http://schemas.microsoft.com/office/powerpoint/2012/main"/>
+    </p:ext>
+  </p:extLst>
 </p:presentation>
 </file>
 
@@ -6084,6 +6090,122 @@
 </p:sld>
 </file>
 
+<file path=ppt/slides/slide5.xml><?xml version="1.0" encoding="utf-8"?>
+<p:sld xmlns:a="http://schemas.openxmlformats.org/drawingml/2006/main" xmlns:r="http://schemas.openxmlformats.org/officeDocument/2006/relationships" xmlns:p="http://schemas.openxmlformats.org/presentationml/2006/main">
+  <p:cSld>
+    <p:spTree>
+      <p:nvGrpSpPr>
+        <p:cNvPr id="1" name=""/>
+        <p:cNvGrpSpPr/>
+        <p:nvPr/>
+      </p:nvGrpSpPr>
+      <p:grpSpPr>
+        <a:xfrm>
+          <a:off x="0" y="0"/>
+          <a:ext cx="0" cy="0"/>
+          <a:chOff x="0" y="0"/>
+          <a:chExt cx="0" cy="0"/>
+        </a:xfrm>
+      </p:grpSpPr>
+      <p:sp>
+        <p:nvSpPr>
+          <p:cNvPr id="2" name="제목 1">
+            <a:extLst>
+              <a:ext uri="{FF2B5EF4-FFF2-40B4-BE49-F238E27FC236}">
+                <a16:creationId xmlns:a16="http://schemas.microsoft.com/office/drawing/2014/main" id="{560CD9D6-F877-2106-CE1B-C8F7DB90A7F8}"/>
+              </a:ext>
+            </a:extLst>
+          </p:cNvPr>
+          <p:cNvSpPr>
+            <a:spLocks noGrp="1"/>
+          </p:cNvSpPr>
+          <p:nvPr>
+            <p:ph type="title"/>
+          </p:nvPr>
+        </p:nvSpPr>
+        <p:spPr/>
+        <p:txBody>
+          <a:bodyPr>
+            <a:normAutofit fontScale="90000"/>
+          </a:bodyPr>
+          <a:lstStyle/>
+          <a:p>
+            <a:r>
+              <a:rPr lang="en-US" altLang="ko-KR" dirty="0"/>
+              <a:t>Bullet Collision</a:t>
+            </a:r>
+            <a:endParaRPr lang="ko-KR" altLang="en-US" dirty="0"/>
+          </a:p>
+        </p:txBody>
+      </p:sp>
+      <p:sp>
+        <p:nvSpPr>
+          <p:cNvPr id="3" name="TextBox 2">
+            <a:extLst>
+              <a:ext uri="{FF2B5EF4-FFF2-40B4-BE49-F238E27FC236}">
+                <a16:creationId xmlns:a16="http://schemas.microsoft.com/office/drawing/2014/main" id="{70AFF9B5-73E7-AEA6-BF9C-95D23CEE6BAD}"/>
+              </a:ext>
+            </a:extLst>
+          </p:cNvPr>
+          <p:cNvSpPr txBox="1"/>
+          <p:nvPr/>
+        </p:nvSpPr>
+        <p:spPr>
+          <a:xfrm>
+            <a:off x="168675" y="1118586"/>
+            <a:ext cx="6550126" cy="369332"/>
+          </a:xfrm>
+          <a:prstGeom prst="rect">
+            <a:avLst/>
+          </a:prstGeom>
+          <a:noFill/>
+        </p:spPr>
+        <p:txBody>
+          <a:bodyPr wrap="none" rtlCol="0">
+            <a:spAutoFit/>
+          </a:bodyPr>
+          <a:lstStyle/>
+          <a:p>
+            <a:r>
+              <a:rPr lang="ko-KR" altLang="en-US" dirty="0"/>
+              <a:t>객체 생성 시 </a:t>
+            </a:r>
+            <a:r>
+              <a:rPr lang="en-US" altLang="ko-KR" dirty="0"/>
+              <a:t>Bullet</a:t>
+            </a:r>
+            <a:r>
+              <a:rPr lang="ko-KR" altLang="en-US" dirty="0"/>
+              <a:t>의 영향을 받는 객체면</a:t>
+            </a:r>
+            <a:r>
+              <a:rPr lang="en-US" altLang="ko-KR" dirty="0"/>
+              <a:t>, </a:t>
+            </a:r>
+            <a:r>
+              <a:rPr lang="en-US" altLang="ko-KR" dirty="0" err="1"/>
+              <a:t>BulletController</a:t>
+            </a:r>
+            <a:r>
+              <a:rPr lang="ko-KR" altLang="en-US" dirty="0"/>
+              <a:t>에 </a:t>
+            </a:r>
+          </a:p>
+        </p:txBody>
+      </p:sp>
+    </p:spTree>
+    <p:extLst>
+      <p:ext uri="{BB962C8B-B14F-4D97-AF65-F5344CB8AC3E}">
+        <p14:creationId xmlns:p14="http://schemas.microsoft.com/office/powerpoint/2010/main" val="97524970"/>
+      </p:ext>
+    </p:extLst>
+  </p:cSld>
+  <p:clrMapOvr>
+    <a:masterClrMapping/>
+  </p:clrMapOvr>
+</p:sld>
+</file>
+
 <file path=ppt/theme/theme1.xml><?xml version="1.0" encoding="utf-8"?>
 <a:theme xmlns:a="http://schemas.openxmlformats.org/drawingml/2006/main" name="Office 테마">
   <a:themeElements>

</xml_diff>

<commit_message>
bullet collision with monster
</commit_message>
<xml_diff>
--- a/Documents/framework.pptx
+++ b/Documents/framework.pptx
@@ -6794,7 +6794,7 @@
         <p:spPr>
           <a:xfrm>
             <a:off x="137360" y="987064"/>
-            <a:ext cx="10685554" cy="3693319"/>
+            <a:ext cx="10685554" cy="2862322"/>
           </a:xfrm>
           <a:prstGeom prst="rect">
             <a:avLst/>
@@ -7010,11 +7010,21 @@
           </a:p>
           <a:p>
             <a:r>
-              <a:rPr lang="en-US" altLang="ko-KR" b="1" dirty="0"/>
-              <a:t>[ Player</a:t>
-            </a:r>
-            <a:r>
-              <a:rPr lang="ko-KR" altLang="en-US" b="1" dirty="0"/>
+              <a:rPr lang="en-US" altLang="ko-KR" b="1"/>
+              <a:t>[ </a:t>
+            </a:r>
+            <a:r>
+              <a:rPr lang="en-US" altLang="ko-KR" sz="1800">
+                <a:solidFill>
+                  <a:srgbClr val="2B91AF"/>
+                </a:solidFill>
+                <a:latin typeface="돋움체" panose="020B0609000101010101" pitchFamily="49" charset="-127"/>
+                <a:ea typeface="돋움체" panose="020B0609000101010101" pitchFamily="49" charset="-127"/>
+              </a:rPr>
+              <a:t>ICollisionable_2D</a:t>
+            </a:r>
+            <a:r>
+              <a:rPr lang="en-US" altLang="ko-KR" b="1"/>
               <a:t> </a:t>
             </a:r>
             <a:r>
@@ -7024,24 +7034,10 @@
           </a:p>
           <a:p>
             <a:r>
-              <a:rPr lang="en-US" altLang="ko-KR" dirty="0"/>
-              <a:t>- </a:t>
-            </a:r>
-          </a:p>
-          <a:p>
+              <a:rPr lang="en-US" altLang="ko-KR" b="1" dirty="0"/>
+              <a:t>	</a:t>
+            </a:r>
             <a:endParaRPr lang="en-US" altLang="ko-KR" dirty="0"/>
-          </a:p>
-          <a:p>
-            <a:r>
-              <a:rPr lang="en-US" altLang="ko-KR" b="1" dirty="0"/>
-              <a:t>[ Monster ]</a:t>
-            </a:r>
-          </a:p>
-          <a:p>
-            <a:r>
-              <a:rPr lang="en-US" altLang="ko-KR" dirty="0"/>
-              <a:t>- </a:t>
-            </a:r>
           </a:p>
           <a:p>
             <a:endParaRPr lang="ko-KR" altLang="en-US" dirty="0"/>

</xml_diff>

<commit_message>
add building (no collision detection)
</commit_message>
<xml_diff>
--- a/Documents/framework.pptx
+++ b/Documents/framework.pptx
@@ -265,7 +265,7 @@
           <a:p>
             <a:fld id="{4F5FCB90-D3BA-4E36-BA8E-CBC4C5011F3D}" type="datetimeFigureOut">
               <a:rPr lang="ko-KR" altLang="en-US" smtClean="0"/>
-              <a:t>2022-11-26</a:t>
+              <a:t>2022-11-27</a:t>
             </a:fld>
             <a:endParaRPr lang="ko-KR" altLang="en-US"/>
           </a:p>
@@ -463,7 +463,7 @@
           <a:p>
             <a:fld id="{4F5FCB90-D3BA-4E36-BA8E-CBC4C5011F3D}" type="datetimeFigureOut">
               <a:rPr lang="ko-KR" altLang="en-US" smtClean="0"/>
-              <a:t>2022-11-26</a:t>
+              <a:t>2022-11-27</a:t>
             </a:fld>
             <a:endParaRPr lang="ko-KR" altLang="en-US"/>
           </a:p>
@@ -671,7 +671,7 @@
           <a:p>
             <a:fld id="{4F5FCB90-D3BA-4E36-BA8E-CBC4C5011F3D}" type="datetimeFigureOut">
               <a:rPr lang="ko-KR" altLang="en-US" smtClean="0"/>
-              <a:t>2022-11-26</a:t>
+              <a:t>2022-11-27</a:t>
             </a:fld>
             <a:endParaRPr lang="ko-KR" altLang="en-US"/>
           </a:p>
@@ -1063,7 +1063,7 @@
           <a:p>
             <a:fld id="{4F5FCB90-D3BA-4E36-BA8E-CBC4C5011F3D}" type="datetimeFigureOut">
               <a:rPr lang="ko-KR" altLang="en-US" smtClean="0"/>
-              <a:t>2022-11-26</a:t>
+              <a:t>2022-11-27</a:t>
             </a:fld>
             <a:endParaRPr lang="ko-KR" altLang="en-US"/>
           </a:p>
@@ -1328,7 +1328,7 @@
           <a:p>
             <a:fld id="{4F5FCB90-D3BA-4E36-BA8E-CBC4C5011F3D}" type="datetimeFigureOut">
               <a:rPr lang="ko-KR" altLang="en-US" smtClean="0"/>
-              <a:t>2022-11-26</a:t>
+              <a:t>2022-11-27</a:t>
             </a:fld>
             <a:endParaRPr lang="ko-KR" altLang="en-US"/>
           </a:p>
@@ -1740,7 +1740,7 @@
           <a:p>
             <a:fld id="{4F5FCB90-D3BA-4E36-BA8E-CBC4C5011F3D}" type="datetimeFigureOut">
               <a:rPr lang="ko-KR" altLang="en-US" smtClean="0"/>
-              <a:t>2022-11-26</a:t>
+              <a:t>2022-11-27</a:t>
             </a:fld>
             <a:endParaRPr lang="ko-KR" altLang="en-US"/>
           </a:p>
@@ -1881,7 +1881,7 @@
           <a:p>
             <a:fld id="{4F5FCB90-D3BA-4E36-BA8E-CBC4C5011F3D}" type="datetimeFigureOut">
               <a:rPr lang="ko-KR" altLang="en-US" smtClean="0"/>
-              <a:t>2022-11-26</a:t>
+              <a:t>2022-11-27</a:t>
             </a:fld>
             <a:endParaRPr lang="ko-KR" altLang="en-US"/>
           </a:p>
@@ -1994,7 +1994,7 @@
           <a:p>
             <a:fld id="{4F5FCB90-D3BA-4E36-BA8E-CBC4C5011F3D}" type="datetimeFigureOut">
               <a:rPr lang="ko-KR" altLang="en-US" smtClean="0"/>
-              <a:t>2022-11-26</a:t>
+              <a:t>2022-11-27</a:t>
             </a:fld>
             <a:endParaRPr lang="ko-KR" altLang="en-US"/>
           </a:p>
@@ -2305,7 +2305,7 @@
           <a:p>
             <a:fld id="{4F5FCB90-D3BA-4E36-BA8E-CBC4C5011F3D}" type="datetimeFigureOut">
               <a:rPr lang="ko-KR" altLang="en-US" smtClean="0"/>
-              <a:t>2022-11-26</a:t>
+              <a:t>2022-11-27</a:t>
             </a:fld>
             <a:endParaRPr lang="ko-KR" altLang="en-US"/>
           </a:p>
@@ -2593,7 +2593,7 @@
           <a:p>
             <a:fld id="{4F5FCB90-D3BA-4E36-BA8E-CBC4C5011F3D}" type="datetimeFigureOut">
               <a:rPr lang="ko-KR" altLang="en-US" smtClean="0"/>
-              <a:t>2022-11-26</a:t>
+              <a:t>2022-11-27</a:t>
             </a:fld>
             <a:endParaRPr lang="ko-KR" altLang="en-US"/>
           </a:p>
@@ -2834,7 +2834,7 @@
           <a:p>
             <a:fld id="{4F5FCB90-D3BA-4E36-BA8E-CBC4C5011F3D}" type="datetimeFigureOut">
               <a:rPr lang="ko-KR" altLang="en-US" smtClean="0"/>
-              <a:t>2022-11-26</a:t>
+              <a:t>2022-11-27</a:t>
             </a:fld>
             <a:endParaRPr lang="ko-KR" altLang="en-US"/>
           </a:p>
@@ -6333,8 +6333,8 @@
           <a:p>
             <a:pPr algn="ctr"/>
             <a:r>
-              <a:rPr lang="en-US" altLang="ko-KR" sz="1050" b="1" dirty="0"/>
-              <a:t>Obstacle</a:t>
+              <a:rPr lang="en-US" altLang="ko-KR" sz="1050" b="1"/>
+              <a:t>Building</a:t>
             </a:r>
             <a:endParaRPr lang="ko-KR" altLang="en-US" sz="1050" b="1" dirty="0"/>
           </a:p>

</xml_diff>

<commit_message>
fixed bug - 3ds max obj file to opengl
dsf'lkaewjgfkl;ewajmrlt kwejlckmjaewlkrjmcfalwekmjclkamrjclkawejnmcrkancrlkjaweyhrnikl;fjlkwfase
</commit_message>
<xml_diff>
--- a/Documents/framework.pptx
+++ b/Documents/framework.pptx
@@ -4,6 +4,9 @@
   <p:sldMasterIdLst>
     <p:sldMasterId id="2147483648" r:id="rId1"/>
   </p:sldMasterIdLst>
+  <p:notesMasterIdLst>
+    <p:notesMasterId r:id="rId11"/>
+  </p:notesMasterIdLst>
   <p:sldIdLst>
     <p:sldId id="260" r:id="rId2"/>
     <p:sldId id="261" r:id="rId3"/>
@@ -12,6 +15,8 @@
     <p:sldId id="262" r:id="rId6"/>
     <p:sldId id="263" r:id="rId7"/>
     <p:sldId id="264" r:id="rId8"/>
+    <p:sldId id="266" r:id="rId9"/>
+    <p:sldId id="265" r:id="rId10"/>
   </p:sldIdLst>
   <p:sldSz cx="12192000" cy="6858000"/>
   <p:notesSz cx="6858000" cy="9144000"/>
@@ -118,6 +123,523 @@
 </p:presentation>
 </file>
 
+<file path=ppt/notesMasters/notesMaster1.xml><?xml version="1.0" encoding="utf-8"?>
+<p:notesMaster xmlns:a="http://schemas.openxmlformats.org/drawingml/2006/main" xmlns:r="http://schemas.openxmlformats.org/officeDocument/2006/relationships" xmlns:p="http://schemas.openxmlformats.org/presentationml/2006/main">
+  <p:cSld>
+    <p:bg>
+      <p:bgRef idx="1001">
+        <a:schemeClr val="bg1"/>
+      </p:bgRef>
+    </p:bg>
+    <p:spTree>
+      <p:nvGrpSpPr>
+        <p:cNvPr id="1" name=""/>
+        <p:cNvGrpSpPr/>
+        <p:nvPr/>
+      </p:nvGrpSpPr>
+      <p:grpSpPr>
+        <a:xfrm>
+          <a:off x="0" y="0"/>
+          <a:ext cx="0" cy="0"/>
+          <a:chOff x="0" y="0"/>
+          <a:chExt cx="0" cy="0"/>
+        </a:xfrm>
+      </p:grpSpPr>
+      <p:sp>
+        <p:nvSpPr>
+          <p:cNvPr id="2" name="머리글 개체 틀 1"/>
+          <p:cNvSpPr>
+            <a:spLocks noGrp="1"/>
+          </p:cNvSpPr>
+          <p:nvPr>
+            <p:ph type="hdr" sz="quarter"/>
+          </p:nvPr>
+        </p:nvSpPr>
+        <p:spPr>
+          <a:xfrm>
+            <a:off x="0" y="0"/>
+            <a:ext cx="2971800" cy="458788"/>
+          </a:xfrm>
+          <a:prstGeom prst="rect">
+            <a:avLst/>
+          </a:prstGeom>
+        </p:spPr>
+        <p:txBody>
+          <a:bodyPr vert="horz" lIns="91440" tIns="45720" rIns="91440" bIns="45720" rtlCol="0"/>
+          <a:lstStyle>
+            <a:lvl1pPr algn="l">
+              <a:defRPr sz="1200"/>
+            </a:lvl1pPr>
+          </a:lstStyle>
+          <a:p>
+            <a:endParaRPr lang="ko-KR" altLang="en-US"/>
+          </a:p>
+        </p:txBody>
+      </p:sp>
+      <p:sp>
+        <p:nvSpPr>
+          <p:cNvPr id="3" name="날짜 개체 틀 2"/>
+          <p:cNvSpPr>
+            <a:spLocks noGrp="1"/>
+          </p:cNvSpPr>
+          <p:nvPr>
+            <p:ph type="dt" idx="1"/>
+          </p:nvPr>
+        </p:nvSpPr>
+        <p:spPr>
+          <a:xfrm>
+            <a:off x="3884613" y="0"/>
+            <a:ext cx="2971800" cy="458788"/>
+          </a:xfrm>
+          <a:prstGeom prst="rect">
+            <a:avLst/>
+          </a:prstGeom>
+        </p:spPr>
+        <p:txBody>
+          <a:bodyPr vert="horz" lIns="91440" tIns="45720" rIns="91440" bIns="45720" rtlCol="0"/>
+          <a:lstStyle>
+            <a:lvl1pPr algn="r">
+              <a:defRPr sz="1200"/>
+            </a:lvl1pPr>
+          </a:lstStyle>
+          <a:p>
+            <a:fld id="{AB70A8C5-4095-465E-8A2A-A6F1189F9644}" type="datetimeFigureOut">
+              <a:rPr lang="ko-KR" altLang="en-US" smtClean="0"/>
+              <a:t>2022-12-02</a:t>
+            </a:fld>
+            <a:endParaRPr lang="ko-KR" altLang="en-US"/>
+          </a:p>
+        </p:txBody>
+      </p:sp>
+      <p:sp>
+        <p:nvSpPr>
+          <p:cNvPr id="4" name="슬라이드 이미지 개체 틀 3"/>
+          <p:cNvSpPr>
+            <a:spLocks noGrp="1" noRot="1" noChangeAspect="1"/>
+          </p:cNvSpPr>
+          <p:nvPr>
+            <p:ph type="sldImg" idx="2"/>
+          </p:nvPr>
+        </p:nvSpPr>
+        <p:spPr>
+          <a:xfrm>
+            <a:off x="685800" y="1143000"/>
+            <a:ext cx="5486400" cy="3086100"/>
+          </a:xfrm>
+          <a:prstGeom prst="rect">
+            <a:avLst/>
+          </a:prstGeom>
+          <a:noFill/>
+          <a:ln w="12700">
+            <a:solidFill>
+              <a:prstClr val="black"/>
+            </a:solidFill>
+          </a:ln>
+        </p:spPr>
+        <p:txBody>
+          <a:bodyPr vert="horz" lIns="91440" tIns="45720" rIns="91440" bIns="45720" rtlCol="0" anchor="ctr"/>
+          <a:lstStyle/>
+          <a:p>
+            <a:endParaRPr lang="ko-KR" altLang="en-US"/>
+          </a:p>
+        </p:txBody>
+      </p:sp>
+      <p:sp>
+        <p:nvSpPr>
+          <p:cNvPr id="5" name="슬라이드 노트 개체 틀 4"/>
+          <p:cNvSpPr>
+            <a:spLocks noGrp="1"/>
+          </p:cNvSpPr>
+          <p:nvPr>
+            <p:ph type="body" sz="quarter" idx="3"/>
+          </p:nvPr>
+        </p:nvSpPr>
+        <p:spPr>
+          <a:xfrm>
+            <a:off x="685800" y="4400550"/>
+            <a:ext cx="5486400" cy="3600450"/>
+          </a:xfrm>
+          <a:prstGeom prst="rect">
+            <a:avLst/>
+          </a:prstGeom>
+        </p:spPr>
+        <p:txBody>
+          <a:bodyPr vert="horz" lIns="91440" tIns="45720" rIns="91440" bIns="45720" rtlCol="0"/>
+          <a:lstStyle/>
+          <a:p>
+            <a:pPr lvl="0"/>
+            <a:r>
+              <a:rPr lang="ko-KR" altLang="en-US"/>
+              <a:t>마스터 텍스트 스타일을 편집하려면 클릭</a:t>
+            </a:r>
+          </a:p>
+          <a:p>
+            <a:pPr lvl="1"/>
+            <a:r>
+              <a:rPr lang="ko-KR" altLang="en-US"/>
+              <a:t>두 번째 수준</a:t>
+            </a:r>
+          </a:p>
+          <a:p>
+            <a:pPr lvl="2"/>
+            <a:r>
+              <a:rPr lang="ko-KR" altLang="en-US"/>
+              <a:t>세 번째 수준</a:t>
+            </a:r>
+          </a:p>
+          <a:p>
+            <a:pPr lvl="3"/>
+            <a:r>
+              <a:rPr lang="ko-KR" altLang="en-US"/>
+              <a:t>네 번째 수준</a:t>
+            </a:r>
+          </a:p>
+          <a:p>
+            <a:pPr lvl="4"/>
+            <a:r>
+              <a:rPr lang="ko-KR" altLang="en-US"/>
+              <a:t>다섯 번째 수준</a:t>
+            </a:r>
+          </a:p>
+        </p:txBody>
+      </p:sp>
+      <p:sp>
+        <p:nvSpPr>
+          <p:cNvPr id="6" name="바닥글 개체 틀 5"/>
+          <p:cNvSpPr>
+            <a:spLocks noGrp="1"/>
+          </p:cNvSpPr>
+          <p:nvPr>
+            <p:ph type="ftr" sz="quarter" idx="4"/>
+          </p:nvPr>
+        </p:nvSpPr>
+        <p:spPr>
+          <a:xfrm>
+            <a:off x="0" y="8685213"/>
+            <a:ext cx="2971800" cy="458787"/>
+          </a:xfrm>
+          <a:prstGeom prst="rect">
+            <a:avLst/>
+          </a:prstGeom>
+        </p:spPr>
+        <p:txBody>
+          <a:bodyPr vert="horz" lIns="91440" tIns="45720" rIns="91440" bIns="45720" rtlCol="0" anchor="b"/>
+          <a:lstStyle>
+            <a:lvl1pPr algn="l">
+              <a:defRPr sz="1200"/>
+            </a:lvl1pPr>
+          </a:lstStyle>
+          <a:p>
+            <a:endParaRPr lang="ko-KR" altLang="en-US"/>
+          </a:p>
+        </p:txBody>
+      </p:sp>
+      <p:sp>
+        <p:nvSpPr>
+          <p:cNvPr id="7" name="슬라이드 번호 개체 틀 6"/>
+          <p:cNvSpPr>
+            <a:spLocks noGrp="1"/>
+          </p:cNvSpPr>
+          <p:nvPr>
+            <p:ph type="sldNum" sz="quarter" idx="5"/>
+          </p:nvPr>
+        </p:nvSpPr>
+        <p:spPr>
+          <a:xfrm>
+            <a:off x="3884613" y="8685213"/>
+            <a:ext cx="2971800" cy="458787"/>
+          </a:xfrm>
+          <a:prstGeom prst="rect">
+            <a:avLst/>
+          </a:prstGeom>
+        </p:spPr>
+        <p:txBody>
+          <a:bodyPr vert="horz" lIns="91440" tIns="45720" rIns="91440" bIns="45720" rtlCol="0" anchor="b"/>
+          <a:lstStyle>
+            <a:lvl1pPr algn="r">
+              <a:defRPr sz="1200"/>
+            </a:lvl1pPr>
+          </a:lstStyle>
+          <a:p>
+            <a:fld id="{EF977E4E-4EC1-45BC-9900-038247020F5A}" type="slidenum">
+              <a:rPr lang="ko-KR" altLang="en-US" smtClean="0"/>
+              <a:t>‹#›</a:t>
+            </a:fld>
+            <a:endParaRPr lang="ko-KR" altLang="en-US"/>
+          </a:p>
+        </p:txBody>
+      </p:sp>
+    </p:spTree>
+    <p:extLst>
+      <p:ext uri="{BB962C8B-B14F-4D97-AF65-F5344CB8AC3E}">
+        <p14:creationId xmlns:p14="http://schemas.microsoft.com/office/powerpoint/2010/main" val="1325190974"/>
+      </p:ext>
+    </p:extLst>
+  </p:cSld>
+  <p:clrMap bg1="lt1" tx1="dk1" bg2="lt2" tx2="dk2" accent1="accent1" accent2="accent2" accent3="accent3" accent4="accent4" accent5="accent5" accent6="accent6" hlink="hlink" folHlink="folHlink"/>
+  <p:notesStyle>
+    <a:lvl1pPr marL="0" algn="l" defTabSz="914400" rtl="0" eaLnBrk="1" latinLnBrk="1" hangingPunct="1">
+      <a:defRPr sz="1200" kern="1200">
+        <a:solidFill>
+          <a:schemeClr val="tx1"/>
+        </a:solidFill>
+        <a:latin typeface="+mn-lt"/>
+        <a:ea typeface="+mn-ea"/>
+        <a:cs typeface="+mn-cs"/>
+      </a:defRPr>
+    </a:lvl1pPr>
+    <a:lvl2pPr marL="457200" algn="l" defTabSz="914400" rtl="0" eaLnBrk="1" latinLnBrk="1" hangingPunct="1">
+      <a:defRPr sz="1200" kern="1200">
+        <a:solidFill>
+          <a:schemeClr val="tx1"/>
+        </a:solidFill>
+        <a:latin typeface="+mn-lt"/>
+        <a:ea typeface="+mn-ea"/>
+        <a:cs typeface="+mn-cs"/>
+      </a:defRPr>
+    </a:lvl2pPr>
+    <a:lvl3pPr marL="914400" algn="l" defTabSz="914400" rtl="0" eaLnBrk="1" latinLnBrk="1" hangingPunct="1">
+      <a:defRPr sz="1200" kern="1200">
+        <a:solidFill>
+          <a:schemeClr val="tx1"/>
+        </a:solidFill>
+        <a:latin typeface="+mn-lt"/>
+        <a:ea typeface="+mn-ea"/>
+        <a:cs typeface="+mn-cs"/>
+      </a:defRPr>
+    </a:lvl3pPr>
+    <a:lvl4pPr marL="1371600" algn="l" defTabSz="914400" rtl="0" eaLnBrk="1" latinLnBrk="1" hangingPunct="1">
+      <a:defRPr sz="1200" kern="1200">
+        <a:solidFill>
+          <a:schemeClr val="tx1"/>
+        </a:solidFill>
+        <a:latin typeface="+mn-lt"/>
+        <a:ea typeface="+mn-ea"/>
+        <a:cs typeface="+mn-cs"/>
+      </a:defRPr>
+    </a:lvl4pPr>
+    <a:lvl5pPr marL="1828800" algn="l" defTabSz="914400" rtl="0" eaLnBrk="1" latinLnBrk="1" hangingPunct="1">
+      <a:defRPr sz="1200" kern="1200">
+        <a:solidFill>
+          <a:schemeClr val="tx1"/>
+        </a:solidFill>
+        <a:latin typeface="+mn-lt"/>
+        <a:ea typeface="+mn-ea"/>
+        <a:cs typeface="+mn-cs"/>
+      </a:defRPr>
+    </a:lvl5pPr>
+    <a:lvl6pPr marL="2286000" algn="l" defTabSz="914400" rtl="0" eaLnBrk="1" latinLnBrk="1" hangingPunct="1">
+      <a:defRPr sz="1200" kern="1200">
+        <a:solidFill>
+          <a:schemeClr val="tx1"/>
+        </a:solidFill>
+        <a:latin typeface="+mn-lt"/>
+        <a:ea typeface="+mn-ea"/>
+        <a:cs typeface="+mn-cs"/>
+      </a:defRPr>
+    </a:lvl6pPr>
+    <a:lvl7pPr marL="2743200" algn="l" defTabSz="914400" rtl="0" eaLnBrk="1" latinLnBrk="1" hangingPunct="1">
+      <a:defRPr sz="1200" kern="1200">
+        <a:solidFill>
+          <a:schemeClr val="tx1"/>
+        </a:solidFill>
+        <a:latin typeface="+mn-lt"/>
+        <a:ea typeface="+mn-ea"/>
+        <a:cs typeface="+mn-cs"/>
+      </a:defRPr>
+    </a:lvl7pPr>
+    <a:lvl8pPr marL="3200400" algn="l" defTabSz="914400" rtl="0" eaLnBrk="1" latinLnBrk="1" hangingPunct="1">
+      <a:defRPr sz="1200" kern="1200">
+        <a:solidFill>
+          <a:schemeClr val="tx1"/>
+        </a:solidFill>
+        <a:latin typeface="+mn-lt"/>
+        <a:ea typeface="+mn-ea"/>
+        <a:cs typeface="+mn-cs"/>
+      </a:defRPr>
+    </a:lvl8pPr>
+    <a:lvl9pPr marL="3657600" algn="l" defTabSz="914400" rtl="0" eaLnBrk="1" latinLnBrk="1" hangingPunct="1">
+      <a:defRPr sz="1200" kern="1200">
+        <a:solidFill>
+          <a:schemeClr val="tx1"/>
+        </a:solidFill>
+        <a:latin typeface="+mn-lt"/>
+        <a:ea typeface="+mn-ea"/>
+        <a:cs typeface="+mn-cs"/>
+      </a:defRPr>
+    </a:lvl9pPr>
+  </p:notesStyle>
+</p:notesMaster>
+</file>
+
+<file path=ppt/notesSlides/notesSlide1.xml><?xml version="1.0" encoding="utf-8"?>
+<p:notes xmlns:a="http://schemas.openxmlformats.org/drawingml/2006/main" xmlns:r="http://schemas.openxmlformats.org/officeDocument/2006/relationships" xmlns:p="http://schemas.openxmlformats.org/presentationml/2006/main">
+  <p:cSld>
+    <p:spTree>
+      <p:nvGrpSpPr>
+        <p:cNvPr id="1" name=""/>
+        <p:cNvGrpSpPr/>
+        <p:nvPr/>
+      </p:nvGrpSpPr>
+      <p:grpSpPr>
+        <a:xfrm>
+          <a:off x="0" y="0"/>
+          <a:ext cx="0" cy="0"/>
+          <a:chOff x="0" y="0"/>
+          <a:chExt cx="0" cy="0"/>
+        </a:xfrm>
+      </p:grpSpPr>
+      <p:sp>
+        <p:nvSpPr>
+          <p:cNvPr id="2" name="슬라이드 이미지 개체 틀 1"/>
+          <p:cNvSpPr>
+            <a:spLocks noGrp="1" noRot="1" noChangeAspect="1"/>
+          </p:cNvSpPr>
+          <p:nvPr>
+            <p:ph type="sldImg"/>
+          </p:nvPr>
+        </p:nvSpPr>
+        <p:spPr/>
+      </p:sp>
+      <p:sp>
+        <p:nvSpPr>
+          <p:cNvPr id="3" name="슬라이드 노트 개체 틀 2"/>
+          <p:cNvSpPr>
+            <a:spLocks noGrp="1"/>
+          </p:cNvSpPr>
+          <p:nvPr>
+            <p:ph type="body" idx="1"/>
+          </p:nvPr>
+        </p:nvSpPr>
+        <p:spPr/>
+        <p:txBody>
+          <a:bodyPr/>
+          <a:lstStyle/>
+          <a:p>
+            <a:endParaRPr lang="ko-KR" altLang="en-US" dirty="0"/>
+          </a:p>
+        </p:txBody>
+      </p:sp>
+      <p:sp>
+        <p:nvSpPr>
+          <p:cNvPr id="4" name="슬라이드 번호 개체 틀 3"/>
+          <p:cNvSpPr>
+            <a:spLocks noGrp="1"/>
+          </p:cNvSpPr>
+          <p:nvPr>
+            <p:ph type="sldNum" sz="quarter" idx="5"/>
+          </p:nvPr>
+        </p:nvSpPr>
+        <p:spPr/>
+        <p:txBody>
+          <a:bodyPr/>
+          <a:lstStyle/>
+          <a:p>
+            <a:fld id="{EF977E4E-4EC1-45BC-9900-038247020F5A}" type="slidenum">
+              <a:rPr lang="ko-KR" altLang="en-US" smtClean="0"/>
+              <a:t>8</a:t>
+            </a:fld>
+            <a:endParaRPr lang="ko-KR" altLang="en-US"/>
+          </a:p>
+        </p:txBody>
+      </p:sp>
+    </p:spTree>
+    <p:extLst>
+      <p:ext uri="{BB962C8B-B14F-4D97-AF65-F5344CB8AC3E}">
+        <p14:creationId xmlns:p14="http://schemas.microsoft.com/office/powerpoint/2010/main" val="2069072242"/>
+      </p:ext>
+    </p:extLst>
+  </p:cSld>
+  <p:clrMapOvr>
+    <a:masterClrMapping/>
+  </p:clrMapOvr>
+</p:notes>
+</file>
+
+<file path=ppt/notesSlides/notesSlide2.xml><?xml version="1.0" encoding="utf-8"?>
+<p:notes xmlns:a="http://schemas.openxmlformats.org/drawingml/2006/main" xmlns:r="http://schemas.openxmlformats.org/officeDocument/2006/relationships" xmlns:p="http://schemas.openxmlformats.org/presentationml/2006/main">
+  <p:cSld>
+    <p:spTree>
+      <p:nvGrpSpPr>
+        <p:cNvPr id="1" name=""/>
+        <p:cNvGrpSpPr/>
+        <p:nvPr/>
+      </p:nvGrpSpPr>
+      <p:grpSpPr>
+        <a:xfrm>
+          <a:off x="0" y="0"/>
+          <a:ext cx="0" cy="0"/>
+          <a:chOff x="0" y="0"/>
+          <a:chExt cx="0" cy="0"/>
+        </a:xfrm>
+      </p:grpSpPr>
+      <p:sp>
+        <p:nvSpPr>
+          <p:cNvPr id="2" name="슬라이드 이미지 개체 틀 1"/>
+          <p:cNvSpPr>
+            <a:spLocks noGrp="1" noRot="1" noChangeAspect="1"/>
+          </p:cNvSpPr>
+          <p:nvPr>
+            <p:ph type="sldImg"/>
+          </p:nvPr>
+        </p:nvSpPr>
+        <p:spPr/>
+      </p:sp>
+      <p:sp>
+        <p:nvSpPr>
+          <p:cNvPr id="3" name="슬라이드 노트 개체 틀 2"/>
+          <p:cNvSpPr>
+            <a:spLocks noGrp="1"/>
+          </p:cNvSpPr>
+          <p:nvPr>
+            <p:ph type="body" idx="1"/>
+          </p:nvPr>
+        </p:nvSpPr>
+        <p:spPr/>
+        <p:txBody>
+          <a:bodyPr/>
+          <a:lstStyle/>
+          <a:p>
+            <a:endParaRPr lang="ko-KR" altLang="en-US" dirty="0"/>
+          </a:p>
+        </p:txBody>
+      </p:sp>
+      <p:sp>
+        <p:nvSpPr>
+          <p:cNvPr id="4" name="슬라이드 번호 개체 틀 3"/>
+          <p:cNvSpPr>
+            <a:spLocks noGrp="1"/>
+          </p:cNvSpPr>
+          <p:nvPr>
+            <p:ph type="sldNum" sz="quarter" idx="5"/>
+          </p:nvPr>
+        </p:nvSpPr>
+        <p:spPr/>
+        <p:txBody>
+          <a:bodyPr/>
+          <a:lstStyle/>
+          <a:p>
+            <a:fld id="{EF977E4E-4EC1-45BC-9900-038247020F5A}" type="slidenum">
+              <a:rPr lang="ko-KR" altLang="en-US" smtClean="0"/>
+              <a:t>9</a:t>
+            </a:fld>
+            <a:endParaRPr lang="ko-KR" altLang="en-US"/>
+          </a:p>
+        </p:txBody>
+      </p:sp>
+    </p:spTree>
+    <p:extLst>
+      <p:ext uri="{BB962C8B-B14F-4D97-AF65-F5344CB8AC3E}">
+        <p14:creationId xmlns:p14="http://schemas.microsoft.com/office/powerpoint/2010/main" val="1350152530"/>
+      </p:ext>
+    </p:extLst>
+  </p:cSld>
+  <p:clrMapOvr>
+    <a:masterClrMapping/>
+  </p:clrMapOvr>
+</p:notes>
+</file>
+
 <file path=ppt/slideLayouts/slideLayout1.xml><?xml version="1.0" encoding="utf-8"?>
 <p:sldLayout xmlns:a="http://schemas.openxmlformats.org/drawingml/2006/main" xmlns:r="http://schemas.openxmlformats.org/officeDocument/2006/relationships" xmlns:p="http://schemas.openxmlformats.org/presentationml/2006/main" type="title" preserve="1">
   <p:cSld name="제목 슬라이드">
@@ -265,7 +787,7 @@
           <a:p>
             <a:fld id="{4F5FCB90-D3BA-4E36-BA8E-CBC4C5011F3D}" type="datetimeFigureOut">
               <a:rPr lang="ko-KR" altLang="en-US" smtClean="0"/>
-              <a:t>2022-11-27</a:t>
+              <a:t>2022-12-02</a:t>
             </a:fld>
             <a:endParaRPr lang="ko-KR" altLang="en-US"/>
           </a:p>
@@ -463,7 +985,7 @@
           <a:p>
             <a:fld id="{4F5FCB90-D3BA-4E36-BA8E-CBC4C5011F3D}" type="datetimeFigureOut">
               <a:rPr lang="ko-KR" altLang="en-US" smtClean="0"/>
-              <a:t>2022-11-27</a:t>
+              <a:t>2022-12-02</a:t>
             </a:fld>
             <a:endParaRPr lang="ko-KR" altLang="en-US"/>
           </a:p>
@@ -671,7 +1193,7 @@
           <a:p>
             <a:fld id="{4F5FCB90-D3BA-4E36-BA8E-CBC4C5011F3D}" type="datetimeFigureOut">
               <a:rPr lang="ko-KR" altLang="en-US" smtClean="0"/>
-              <a:t>2022-11-27</a:t>
+              <a:t>2022-12-02</a:t>
             </a:fld>
             <a:endParaRPr lang="ko-KR" altLang="en-US"/>
           </a:p>
@@ -1063,7 +1585,7 @@
           <a:p>
             <a:fld id="{4F5FCB90-D3BA-4E36-BA8E-CBC4C5011F3D}" type="datetimeFigureOut">
               <a:rPr lang="ko-KR" altLang="en-US" smtClean="0"/>
-              <a:t>2022-11-27</a:t>
+              <a:t>2022-12-02</a:t>
             </a:fld>
             <a:endParaRPr lang="ko-KR" altLang="en-US"/>
           </a:p>
@@ -1328,7 +1850,7 @@
           <a:p>
             <a:fld id="{4F5FCB90-D3BA-4E36-BA8E-CBC4C5011F3D}" type="datetimeFigureOut">
               <a:rPr lang="ko-KR" altLang="en-US" smtClean="0"/>
-              <a:t>2022-11-27</a:t>
+              <a:t>2022-12-02</a:t>
             </a:fld>
             <a:endParaRPr lang="ko-KR" altLang="en-US"/>
           </a:p>
@@ -1740,7 +2262,7 @@
           <a:p>
             <a:fld id="{4F5FCB90-D3BA-4E36-BA8E-CBC4C5011F3D}" type="datetimeFigureOut">
               <a:rPr lang="ko-KR" altLang="en-US" smtClean="0"/>
-              <a:t>2022-11-27</a:t>
+              <a:t>2022-12-02</a:t>
             </a:fld>
             <a:endParaRPr lang="ko-KR" altLang="en-US"/>
           </a:p>
@@ -1881,7 +2403,7 @@
           <a:p>
             <a:fld id="{4F5FCB90-D3BA-4E36-BA8E-CBC4C5011F3D}" type="datetimeFigureOut">
               <a:rPr lang="ko-KR" altLang="en-US" smtClean="0"/>
-              <a:t>2022-11-27</a:t>
+              <a:t>2022-12-02</a:t>
             </a:fld>
             <a:endParaRPr lang="ko-KR" altLang="en-US"/>
           </a:p>
@@ -1994,7 +2516,7 @@
           <a:p>
             <a:fld id="{4F5FCB90-D3BA-4E36-BA8E-CBC4C5011F3D}" type="datetimeFigureOut">
               <a:rPr lang="ko-KR" altLang="en-US" smtClean="0"/>
-              <a:t>2022-11-27</a:t>
+              <a:t>2022-12-02</a:t>
             </a:fld>
             <a:endParaRPr lang="ko-KR" altLang="en-US"/>
           </a:p>
@@ -2305,7 +2827,7 @@
           <a:p>
             <a:fld id="{4F5FCB90-D3BA-4E36-BA8E-CBC4C5011F3D}" type="datetimeFigureOut">
               <a:rPr lang="ko-KR" altLang="en-US" smtClean="0"/>
-              <a:t>2022-11-27</a:t>
+              <a:t>2022-12-02</a:t>
             </a:fld>
             <a:endParaRPr lang="ko-KR" altLang="en-US"/>
           </a:p>
@@ -2593,7 +3115,7 @@
           <a:p>
             <a:fld id="{4F5FCB90-D3BA-4E36-BA8E-CBC4C5011F3D}" type="datetimeFigureOut">
               <a:rPr lang="ko-KR" altLang="en-US" smtClean="0"/>
-              <a:t>2022-11-27</a:t>
+              <a:t>2022-12-02</a:t>
             </a:fld>
             <a:endParaRPr lang="ko-KR" altLang="en-US"/>
           </a:p>
@@ -2834,7 +3356,7 @@
           <a:p>
             <a:fld id="{4F5FCB90-D3BA-4E36-BA8E-CBC4C5011F3D}" type="datetimeFigureOut">
               <a:rPr lang="ko-KR" altLang="en-US" smtClean="0"/>
-              <a:t>2022-11-27</a:t>
+              <a:t>2022-12-02</a:t>
             </a:fld>
             <a:endParaRPr lang="ko-KR" altLang="en-US"/>
           </a:p>
@@ -7846,6 +8368,762 @@
 </p:sld>
 </file>
 
+<file path=ppt/slides/slide8.xml><?xml version="1.0" encoding="utf-8"?>
+<p:sld xmlns:a="http://schemas.openxmlformats.org/drawingml/2006/main" xmlns:r="http://schemas.openxmlformats.org/officeDocument/2006/relationships" xmlns:p="http://schemas.openxmlformats.org/presentationml/2006/main">
+  <p:cSld>
+    <p:spTree>
+      <p:nvGrpSpPr>
+        <p:cNvPr id="1" name=""/>
+        <p:cNvGrpSpPr/>
+        <p:nvPr/>
+      </p:nvGrpSpPr>
+      <p:grpSpPr>
+        <a:xfrm>
+          <a:off x="0" y="0"/>
+          <a:ext cx="0" cy="0"/>
+          <a:chOff x="0" y="0"/>
+          <a:chExt cx="0" cy="0"/>
+        </a:xfrm>
+      </p:grpSpPr>
+      <p:sp>
+        <p:nvSpPr>
+          <p:cNvPr id="2" name="제목 1">
+            <a:extLst>
+              <a:ext uri="{FF2B5EF4-FFF2-40B4-BE49-F238E27FC236}">
+                <a16:creationId xmlns:a16="http://schemas.microsoft.com/office/drawing/2014/main" id="{87F25AA0-BFB3-53AE-3659-87610DA4C030}"/>
+              </a:ext>
+            </a:extLst>
+          </p:cNvPr>
+          <p:cNvSpPr>
+            <a:spLocks noGrp="1"/>
+          </p:cNvSpPr>
+          <p:nvPr>
+            <p:ph type="title"/>
+          </p:nvPr>
+        </p:nvSpPr>
+        <p:spPr/>
+        <p:txBody>
+          <a:bodyPr>
+            <a:normAutofit fontScale="90000"/>
+          </a:bodyPr>
+          <a:lstStyle/>
+          <a:p>
+            <a:r>
+              <a:rPr lang="en-US" altLang="ko-KR" dirty="0"/>
+              <a:t>Coordinate</a:t>
+            </a:r>
+            <a:endParaRPr lang="ko-KR" altLang="en-US" dirty="0"/>
+          </a:p>
+        </p:txBody>
+      </p:sp>
+      <p:pic>
+        <p:nvPicPr>
+          <p:cNvPr id="4" name="그림 3">
+            <a:extLst>
+              <a:ext uri="{FF2B5EF4-FFF2-40B4-BE49-F238E27FC236}">
+                <a16:creationId xmlns:a16="http://schemas.microsoft.com/office/drawing/2014/main" id="{0311FF9B-BF9B-7F33-4BED-F3E76EBD16F2}"/>
+              </a:ext>
+            </a:extLst>
+          </p:cNvPr>
+          <p:cNvPicPr>
+            <a:picLocks noChangeAspect="1"/>
+          </p:cNvPicPr>
+          <p:nvPr/>
+        </p:nvPicPr>
+        <p:blipFill>
+          <a:blip r:embed="rId3"/>
+          <a:stretch>
+            <a:fillRect/>
+          </a:stretch>
+        </p:blipFill>
+        <p:spPr>
+          <a:xfrm>
+            <a:off x="724382" y="1227552"/>
+            <a:ext cx="6303213" cy="5192038"/>
+          </a:xfrm>
+          <a:prstGeom prst="rect">
+            <a:avLst/>
+          </a:prstGeom>
+        </p:spPr>
+      </p:pic>
+      <p:grpSp>
+        <p:nvGrpSpPr>
+          <p:cNvPr id="10" name="그룹 9">
+            <a:extLst>
+              <a:ext uri="{FF2B5EF4-FFF2-40B4-BE49-F238E27FC236}">
+                <a16:creationId xmlns:a16="http://schemas.microsoft.com/office/drawing/2014/main" id="{3AB7139A-8A70-322A-E6BC-D45AC6FC9A2C}"/>
+              </a:ext>
+            </a:extLst>
+          </p:cNvPr>
+          <p:cNvGrpSpPr/>
+          <p:nvPr/>
+        </p:nvGrpSpPr>
+        <p:grpSpPr>
+          <a:xfrm>
+            <a:off x="7458209" y="2609771"/>
+            <a:ext cx="4147011" cy="2991267"/>
+            <a:chOff x="5284943" y="3611853"/>
+            <a:chExt cx="4147011" cy="2991267"/>
+          </a:xfrm>
+        </p:grpSpPr>
+        <p:pic>
+          <p:nvPicPr>
+            <p:cNvPr id="5" name="그림 4">
+              <a:extLst>
+                <a:ext uri="{FF2B5EF4-FFF2-40B4-BE49-F238E27FC236}">
+                  <a16:creationId xmlns:a16="http://schemas.microsoft.com/office/drawing/2014/main" id="{67BD6398-6CC9-AB2C-3A1E-D7CAF8944EA2}"/>
+                </a:ext>
+              </a:extLst>
+            </p:cNvPr>
+            <p:cNvPicPr>
+              <a:picLocks noChangeAspect="1"/>
+            </p:cNvPicPr>
+            <p:nvPr/>
+          </p:nvPicPr>
+          <p:blipFill>
+            <a:blip r:embed="rId4"/>
+            <a:stretch>
+              <a:fillRect/>
+            </a:stretch>
+          </p:blipFill>
+          <p:spPr>
+            <a:xfrm>
+              <a:off x="5284943" y="3611853"/>
+              <a:ext cx="1810003" cy="2991267"/>
+            </a:xfrm>
+            <a:prstGeom prst="rect">
+              <a:avLst/>
+            </a:prstGeom>
+          </p:spPr>
+        </p:pic>
+        <p:sp>
+          <p:nvSpPr>
+            <p:cNvPr id="6" name="화살표: 위쪽 5">
+              <a:extLst>
+                <a:ext uri="{FF2B5EF4-FFF2-40B4-BE49-F238E27FC236}">
+                  <a16:creationId xmlns:a16="http://schemas.microsoft.com/office/drawing/2014/main" id="{C5189C8C-F353-D786-14ED-51CB031A0687}"/>
+                </a:ext>
+              </a:extLst>
+            </p:cNvPr>
+            <p:cNvSpPr/>
+            <p:nvPr/>
+          </p:nvSpPr>
+          <p:spPr>
+            <a:xfrm>
+              <a:off x="7333989" y="4421688"/>
+              <a:ext cx="144049" cy="1008345"/>
+            </a:xfrm>
+            <a:prstGeom prst="upArrow">
+              <a:avLst/>
+            </a:prstGeom>
+            <a:ln>
+              <a:solidFill>
+                <a:schemeClr val="tx1"/>
+              </a:solidFill>
+            </a:ln>
+          </p:spPr>
+          <p:style>
+            <a:lnRef idx="2">
+              <a:schemeClr val="accent1">
+                <a:shade val="50000"/>
+              </a:schemeClr>
+            </a:lnRef>
+            <a:fillRef idx="1">
+              <a:schemeClr val="accent1"/>
+            </a:fillRef>
+            <a:effectRef idx="0">
+              <a:schemeClr val="accent1"/>
+            </a:effectRef>
+            <a:fontRef idx="minor">
+              <a:schemeClr val="lt1"/>
+            </a:fontRef>
+          </p:style>
+          <p:txBody>
+            <a:bodyPr rtlCol="0" anchor="ctr"/>
+            <a:lstStyle/>
+            <a:p>
+              <a:pPr algn="ctr"/>
+              <a:endParaRPr lang="ko-KR" altLang="en-US"/>
+            </a:p>
+          </p:txBody>
+        </p:sp>
+        <p:sp>
+          <p:nvSpPr>
+            <p:cNvPr id="7" name="화살표: 위쪽 6">
+              <a:extLst>
+                <a:ext uri="{FF2B5EF4-FFF2-40B4-BE49-F238E27FC236}">
+                  <a16:creationId xmlns:a16="http://schemas.microsoft.com/office/drawing/2014/main" id="{B411D24D-E6D7-244C-847C-BF85D526FC05}"/>
+                </a:ext>
+              </a:extLst>
+            </p:cNvPr>
+            <p:cNvSpPr/>
+            <p:nvPr/>
+          </p:nvSpPr>
+          <p:spPr>
+            <a:xfrm rot="5400000">
+              <a:off x="7812066" y="4906028"/>
+              <a:ext cx="144049" cy="1008345"/>
+            </a:xfrm>
+            <a:prstGeom prst="upArrow">
+              <a:avLst/>
+            </a:prstGeom>
+            <a:solidFill>
+              <a:srgbClr val="FF0000"/>
+            </a:solidFill>
+            <a:ln>
+              <a:solidFill>
+                <a:schemeClr val="tx1"/>
+              </a:solidFill>
+            </a:ln>
+          </p:spPr>
+          <p:style>
+            <a:lnRef idx="2">
+              <a:schemeClr val="accent1">
+                <a:shade val="50000"/>
+              </a:schemeClr>
+            </a:lnRef>
+            <a:fillRef idx="1">
+              <a:schemeClr val="accent1"/>
+            </a:fillRef>
+            <a:effectRef idx="0">
+              <a:schemeClr val="accent1"/>
+            </a:effectRef>
+            <a:fontRef idx="minor">
+              <a:schemeClr val="lt1"/>
+            </a:fontRef>
+          </p:style>
+          <p:txBody>
+            <a:bodyPr rtlCol="0" anchor="ctr"/>
+            <a:lstStyle/>
+            <a:p>
+              <a:pPr algn="ctr"/>
+              <a:endParaRPr lang="ko-KR" altLang="en-US"/>
+            </a:p>
+          </p:txBody>
+        </p:sp>
+        <p:sp>
+          <p:nvSpPr>
+            <p:cNvPr id="8" name="TextBox 7">
+              <a:extLst>
+                <a:ext uri="{FF2B5EF4-FFF2-40B4-BE49-F238E27FC236}">
+                  <a16:creationId xmlns:a16="http://schemas.microsoft.com/office/drawing/2014/main" id="{6A229838-D6F5-59B4-E42D-C653A06124C9}"/>
+                </a:ext>
+              </a:extLst>
+            </p:cNvPr>
+            <p:cNvSpPr txBox="1"/>
+            <p:nvPr/>
+          </p:nvSpPr>
+          <p:spPr>
+            <a:xfrm>
+              <a:off x="6964471" y="4164904"/>
+              <a:ext cx="982961" cy="276999"/>
+            </a:xfrm>
+            <a:prstGeom prst="rect">
+              <a:avLst/>
+            </a:prstGeom>
+            <a:noFill/>
+          </p:spPr>
+          <p:txBody>
+            <a:bodyPr wrap="none" rtlCol="0">
+              <a:spAutoFit/>
+            </a:bodyPr>
+            <a:lstStyle/>
+            <a:p>
+              <a:r>
+                <a:rPr lang="en-US" altLang="ko-KR" sz="1200" dirty="0"/>
+                <a:t>Back(0,0,-1)</a:t>
+              </a:r>
+              <a:endParaRPr lang="ko-KR" altLang="en-US" sz="1200" dirty="0"/>
+            </a:p>
+          </p:txBody>
+        </p:sp>
+        <p:sp>
+          <p:nvSpPr>
+            <p:cNvPr id="9" name="TextBox 8">
+              <a:extLst>
+                <a:ext uri="{FF2B5EF4-FFF2-40B4-BE49-F238E27FC236}">
+                  <a16:creationId xmlns:a16="http://schemas.microsoft.com/office/drawing/2014/main" id="{74669D9B-7421-F8C4-2D3E-D88F33718D2C}"/>
+                </a:ext>
+              </a:extLst>
+            </p:cNvPr>
+            <p:cNvSpPr txBox="1"/>
+            <p:nvPr/>
+          </p:nvSpPr>
+          <p:spPr>
+            <a:xfrm>
+              <a:off x="8463419" y="5306860"/>
+              <a:ext cx="968535" cy="276999"/>
+            </a:xfrm>
+            <a:prstGeom prst="rect">
+              <a:avLst/>
+            </a:prstGeom>
+            <a:noFill/>
+          </p:spPr>
+          <p:txBody>
+            <a:bodyPr wrap="none" rtlCol="0">
+              <a:spAutoFit/>
+            </a:bodyPr>
+            <a:lstStyle/>
+            <a:p>
+              <a:r>
+                <a:rPr lang="en-US" altLang="ko-KR" sz="1200" dirty="0"/>
+                <a:t>Right(1,0,0)</a:t>
+              </a:r>
+              <a:endParaRPr lang="ko-KR" altLang="en-US" sz="1200" dirty="0"/>
+            </a:p>
+          </p:txBody>
+        </p:sp>
+      </p:grpSp>
+      <p:grpSp>
+        <p:nvGrpSpPr>
+          <p:cNvPr id="15" name="그룹 14">
+            <a:extLst>
+              <a:ext uri="{FF2B5EF4-FFF2-40B4-BE49-F238E27FC236}">
+                <a16:creationId xmlns:a16="http://schemas.microsoft.com/office/drawing/2014/main" id="{2A0D8C36-13E1-F7FE-2428-F93EBC348521}"/>
+              </a:ext>
+            </a:extLst>
+          </p:cNvPr>
+          <p:cNvGrpSpPr/>
+          <p:nvPr/>
+        </p:nvGrpSpPr>
+        <p:grpSpPr>
+          <a:xfrm>
+            <a:off x="3496852" y="4294489"/>
+            <a:ext cx="1419616" cy="1074342"/>
+            <a:chOff x="3468039" y="4400812"/>
+            <a:chExt cx="1829758" cy="1494244"/>
+          </a:xfrm>
+        </p:grpSpPr>
+        <p:sp>
+          <p:nvSpPr>
+            <p:cNvPr id="11" name="화살표: 위쪽 10">
+              <a:extLst>
+                <a:ext uri="{FF2B5EF4-FFF2-40B4-BE49-F238E27FC236}">
+                  <a16:creationId xmlns:a16="http://schemas.microsoft.com/office/drawing/2014/main" id="{D4F39B82-C65E-2992-3B48-9B667E631F35}"/>
+                </a:ext>
+              </a:extLst>
+            </p:cNvPr>
+            <p:cNvSpPr/>
+            <p:nvPr/>
+          </p:nvSpPr>
+          <p:spPr>
+            <a:xfrm rot="10800000">
+              <a:off x="3918281" y="4459944"/>
+              <a:ext cx="144049" cy="1008345"/>
+            </a:xfrm>
+            <a:prstGeom prst="upArrow">
+              <a:avLst/>
+            </a:prstGeom>
+            <a:ln>
+              <a:solidFill>
+                <a:schemeClr val="tx1"/>
+              </a:solidFill>
+            </a:ln>
+          </p:spPr>
+          <p:style>
+            <a:lnRef idx="2">
+              <a:schemeClr val="accent1">
+                <a:shade val="50000"/>
+              </a:schemeClr>
+            </a:lnRef>
+            <a:fillRef idx="1">
+              <a:schemeClr val="accent1"/>
+            </a:fillRef>
+            <a:effectRef idx="0">
+              <a:schemeClr val="accent1"/>
+            </a:effectRef>
+            <a:fontRef idx="minor">
+              <a:schemeClr val="lt1"/>
+            </a:fontRef>
+          </p:style>
+          <p:txBody>
+            <a:bodyPr rtlCol="0" anchor="ctr"/>
+            <a:lstStyle/>
+            <a:p>
+              <a:pPr algn="ctr"/>
+              <a:endParaRPr lang="ko-KR" altLang="en-US"/>
+            </a:p>
+          </p:txBody>
+        </p:sp>
+        <p:sp>
+          <p:nvSpPr>
+            <p:cNvPr id="12" name="화살표: 위쪽 11">
+              <a:extLst>
+                <a:ext uri="{FF2B5EF4-FFF2-40B4-BE49-F238E27FC236}">
+                  <a16:creationId xmlns:a16="http://schemas.microsoft.com/office/drawing/2014/main" id="{9CF50DDA-8347-2FAD-3F64-D5ED1F8F8FD1}"/>
+                </a:ext>
+              </a:extLst>
+            </p:cNvPr>
+            <p:cNvSpPr/>
+            <p:nvPr/>
+          </p:nvSpPr>
+          <p:spPr>
+            <a:xfrm rot="5400000">
+              <a:off x="4388286" y="3968664"/>
+              <a:ext cx="144049" cy="1008345"/>
+            </a:xfrm>
+            <a:prstGeom prst="upArrow">
+              <a:avLst/>
+            </a:prstGeom>
+            <a:solidFill>
+              <a:srgbClr val="FF0000"/>
+            </a:solidFill>
+            <a:ln>
+              <a:solidFill>
+                <a:schemeClr val="tx1"/>
+              </a:solidFill>
+            </a:ln>
+          </p:spPr>
+          <p:style>
+            <a:lnRef idx="2">
+              <a:schemeClr val="accent1">
+                <a:shade val="50000"/>
+              </a:schemeClr>
+            </a:lnRef>
+            <a:fillRef idx="1">
+              <a:schemeClr val="accent1"/>
+            </a:fillRef>
+            <a:effectRef idx="0">
+              <a:schemeClr val="accent1"/>
+            </a:effectRef>
+            <a:fontRef idx="minor">
+              <a:schemeClr val="lt1"/>
+            </a:fontRef>
+          </p:style>
+          <p:txBody>
+            <a:bodyPr rtlCol="0" anchor="ctr"/>
+            <a:lstStyle/>
+            <a:p>
+              <a:pPr algn="ctr"/>
+              <a:endParaRPr lang="ko-KR" altLang="en-US"/>
+            </a:p>
+          </p:txBody>
+        </p:sp>
+        <p:sp>
+          <p:nvSpPr>
+            <p:cNvPr id="13" name="TextBox 12">
+              <a:extLst>
+                <a:ext uri="{FF2B5EF4-FFF2-40B4-BE49-F238E27FC236}">
+                  <a16:creationId xmlns:a16="http://schemas.microsoft.com/office/drawing/2014/main" id="{5A9C2194-0BDF-3252-E624-23EB1EE592DC}"/>
+                </a:ext>
+              </a:extLst>
+            </p:cNvPr>
+            <p:cNvSpPr txBox="1"/>
+            <p:nvPr/>
+          </p:nvSpPr>
+          <p:spPr>
+            <a:xfrm>
+              <a:off x="3468039" y="5509793"/>
+              <a:ext cx="1243478" cy="385263"/>
+            </a:xfrm>
+            <a:prstGeom prst="rect">
+              <a:avLst/>
+            </a:prstGeom>
+            <a:noFill/>
+          </p:spPr>
+          <p:txBody>
+            <a:bodyPr wrap="none" rtlCol="0">
+              <a:spAutoFit/>
+            </a:bodyPr>
+            <a:lstStyle/>
+            <a:p>
+              <a:r>
+                <a:rPr lang="en-US" altLang="ko-KR" sz="1200" dirty="0"/>
+                <a:t>Front(0,0,1)</a:t>
+              </a:r>
+              <a:endParaRPr lang="ko-KR" altLang="en-US" sz="1200" dirty="0"/>
+            </a:p>
+          </p:txBody>
+        </p:sp>
+        <p:sp>
+          <p:nvSpPr>
+            <p:cNvPr id="14" name="TextBox 13">
+              <a:extLst>
+                <a:ext uri="{FF2B5EF4-FFF2-40B4-BE49-F238E27FC236}">
+                  <a16:creationId xmlns:a16="http://schemas.microsoft.com/office/drawing/2014/main" id="{0DF718B0-8172-7DC2-E271-F9429F302695}"/>
+                </a:ext>
+              </a:extLst>
+            </p:cNvPr>
+            <p:cNvSpPr txBox="1"/>
+            <p:nvPr/>
+          </p:nvSpPr>
+          <p:spPr>
+            <a:xfrm>
+              <a:off x="4329262" y="4613402"/>
+              <a:ext cx="968535" cy="276999"/>
+            </a:xfrm>
+            <a:prstGeom prst="rect">
+              <a:avLst/>
+            </a:prstGeom>
+            <a:noFill/>
+          </p:spPr>
+          <p:txBody>
+            <a:bodyPr wrap="none" rtlCol="0">
+              <a:spAutoFit/>
+            </a:bodyPr>
+            <a:lstStyle/>
+            <a:p>
+              <a:r>
+                <a:rPr lang="en-US" altLang="ko-KR" sz="1200" dirty="0"/>
+                <a:t>Right(1,0,0)</a:t>
+              </a:r>
+              <a:endParaRPr lang="ko-KR" altLang="en-US" sz="1200" dirty="0"/>
+            </a:p>
+          </p:txBody>
+        </p:sp>
+      </p:grpSp>
+    </p:spTree>
+    <p:extLst>
+      <p:ext uri="{BB962C8B-B14F-4D97-AF65-F5344CB8AC3E}">
+        <p14:creationId xmlns:p14="http://schemas.microsoft.com/office/powerpoint/2010/main" val="220147713"/>
+      </p:ext>
+    </p:extLst>
+  </p:cSld>
+  <p:clrMapOvr>
+    <a:masterClrMapping/>
+  </p:clrMapOvr>
+</p:sld>
+</file>
+
+<file path=ppt/slides/slide9.xml><?xml version="1.0" encoding="utf-8"?>
+<p:sld xmlns:a="http://schemas.openxmlformats.org/drawingml/2006/main" xmlns:r="http://schemas.openxmlformats.org/officeDocument/2006/relationships" xmlns:p="http://schemas.openxmlformats.org/presentationml/2006/main">
+  <p:cSld>
+    <p:spTree>
+      <p:nvGrpSpPr>
+        <p:cNvPr id="1" name=""/>
+        <p:cNvGrpSpPr/>
+        <p:nvPr/>
+      </p:nvGrpSpPr>
+      <p:grpSpPr>
+        <a:xfrm>
+          <a:off x="0" y="0"/>
+          <a:ext cx="0" cy="0"/>
+          <a:chOff x="0" y="0"/>
+          <a:chExt cx="0" cy="0"/>
+        </a:xfrm>
+      </p:grpSpPr>
+      <p:sp>
+        <p:nvSpPr>
+          <p:cNvPr id="2" name="제목 1">
+            <a:extLst>
+              <a:ext uri="{FF2B5EF4-FFF2-40B4-BE49-F238E27FC236}">
+                <a16:creationId xmlns:a16="http://schemas.microsoft.com/office/drawing/2014/main" id="{DA6D4F5B-161C-ED15-BD55-35F73DFA2868}"/>
+              </a:ext>
+            </a:extLst>
+          </p:cNvPr>
+          <p:cNvSpPr>
+            <a:spLocks noGrp="1"/>
+          </p:cNvSpPr>
+          <p:nvPr>
+            <p:ph type="title"/>
+          </p:nvPr>
+        </p:nvSpPr>
+        <p:spPr/>
+        <p:txBody>
+          <a:bodyPr>
+            <a:normAutofit fontScale="90000"/>
+          </a:bodyPr>
+          <a:lstStyle/>
+          <a:p>
+            <a:r>
+              <a:rPr lang="en-US" altLang="ko-KR" dirty="0"/>
+              <a:t>3D -&gt; 2D</a:t>
+            </a:r>
+            <a:endParaRPr lang="ko-KR" altLang="en-US" dirty="0"/>
+          </a:p>
+        </p:txBody>
+      </p:sp>
+      <p:sp>
+        <p:nvSpPr>
+          <p:cNvPr id="14" name="화살표: 오른쪽 13">
+            <a:extLst>
+              <a:ext uri="{FF2B5EF4-FFF2-40B4-BE49-F238E27FC236}">
+                <a16:creationId xmlns:a16="http://schemas.microsoft.com/office/drawing/2014/main" id="{D313C807-4C1A-0050-07CD-6A6465204AF4}"/>
+              </a:ext>
+            </a:extLst>
+          </p:cNvPr>
+          <p:cNvSpPr/>
+          <p:nvPr/>
+        </p:nvSpPr>
+        <p:spPr>
+          <a:xfrm>
+            <a:off x="5467610" y="1966586"/>
+            <a:ext cx="1747381" cy="865525"/>
+          </a:xfrm>
+          <a:prstGeom prst="rightArrow">
+            <a:avLst/>
+          </a:prstGeom>
+        </p:spPr>
+        <p:style>
+          <a:lnRef idx="2">
+            <a:schemeClr val="accent1">
+              <a:shade val="50000"/>
+            </a:schemeClr>
+          </a:lnRef>
+          <a:fillRef idx="1">
+            <a:schemeClr val="accent1"/>
+          </a:fillRef>
+          <a:effectRef idx="0">
+            <a:schemeClr val="accent1"/>
+          </a:effectRef>
+          <a:fontRef idx="minor">
+            <a:schemeClr val="lt1"/>
+          </a:fontRef>
+        </p:style>
+        <p:txBody>
+          <a:bodyPr rtlCol="0" anchor="ctr"/>
+          <a:lstStyle/>
+          <a:p>
+            <a:pPr algn="ctr"/>
+            <a:endParaRPr lang="ko-KR" altLang="en-US"/>
+          </a:p>
+        </p:txBody>
+      </p:sp>
+      <p:pic>
+        <p:nvPicPr>
+          <p:cNvPr id="20" name="그림 19">
+            <a:extLst>
+              <a:ext uri="{FF2B5EF4-FFF2-40B4-BE49-F238E27FC236}">
+                <a16:creationId xmlns:a16="http://schemas.microsoft.com/office/drawing/2014/main" id="{9F64714C-5583-4A7C-30B6-2657039CBA67}"/>
+              </a:ext>
+            </a:extLst>
+          </p:cNvPr>
+          <p:cNvPicPr>
+            <a:picLocks noChangeAspect="1"/>
+          </p:cNvPicPr>
+          <p:nvPr/>
+        </p:nvPicPr>
+        <p:blipFill>
+          <a:blip r:embed="rId3"/>
+          <a:stretch>
+            <a:fillRect/>
+          </a:stretch>
+        </p:blipFill>
+        <p:spPr>
+          <a:xfrm>
+            <a:off x="2812689" y="991113"/>
+            <a:ext cx="2310457" cy="2462861"/>
+          </a:xfrm>
+          <a:prstGeom prst="rect">
+            <a:avLst/>
+          </a:prstGeom>
+        </p:spPr>
+      </p:pic>
+      <p:pic>
+        <p:nvPicPr>
+          <p:cNvPr id="22" name="그림 21">
+            <a:extLst>
+              <a:ext uri="{FF2B5EF4-FFF2-40B4-BE49-F238E27FC236}">
+                <a16:creationId xmlns:a16="http://schemas.microsoft.com/office/drawing/2014/main" id="{F333F7C3-802F-F1D6-47B5-036CC8CE0104}"/>
+              </a:ext>
+            </a:extLst>
+          </p:cNvPr>
+          <p:cNvPicPr>
+            <a:picLocks noChangeAspect="1"/>
+          </p:cNvPicPr>
+          <p:nvPr/>
+        </p:nvPicPr>
+        <p:blipFill>
+          <a:blip r:embed="rId4"/>
+          <a:stretch>
+            <a:fillRect/>
+          </a:stretch>
+        </p:blipFill>
+        <p:spPr>
+          <a:xfrm flipV="1">
+            <a:off x="7500223" y="1532905"/>
+            <a:ext cx="1681355" cy="1698809"/>
+          </a:xfrm>
+          <a:prstGeom prst="rect">
+            <a:avLst/>
+          </a:prstGeom>
+        </p:spPr>
+      </p:pic>
+      <p:sp>
+        <p:nvSpPr>
+          <p:cNvPr id="29" name="TextBox 28">
+            <a:extLst>
+              <a:ext uri="{FF2B5EF4-FFF2-40B4-BE49-F238E27FC236}">
+                <a16:creationId xmlns:a16="http://schemas.microsoft.com/office/drawing/2014/main" id="{B7CF22B5-F331-F566-E896-C9EAE80E847B}"/>
+              </a:ext>
+            </a:extLst>
+          </p:cNvPr>
+          <p:cNvSpPr txBox="1"/>
+          <p:nvPr/>
+        </p:nvSpPr>
+        <p:spPr>
+          <a:xfrm>
+            <a:off x="7148186" y="1273480"/>
+            <a:ext cx="694742" cy="276999"/>
+          </a:xfrm>
+          <a:prstGeom prst="rect">
+            <a:avLst/>
+          </a:prstGeom>
+          <a:noFill/>
+        </p:spPr>
+        <p:txBody>
+          <a:bodyPr wrap="none" rtlCol="0">
+            <a:spAutoFit/>
+          </a:bodyPr>
+          <a:lstStyle/>
+          <a:p>
+            <a:r>
+              <a:rPr lang="en-US" altLang="ko-KR" sz="1200" dirty="0" err="1"/>
+              <a:t>LeftTop</a:t>
+            </a:r>
+            <a:endParaRPr lang="ko-KR" altLang="en-US" sz="1200" dirty="0"/>
+          </a:p>
+        </p:txBody>
+      </p:sp>
+      <p:sp>
+        <p:nvSpPr>
+          <p:cNvPr id="30" name="TextBox 29">
+            <a:extLst>
+              <a:ext uri="{FF2B5EF4-FFF2-40B4-BE49-F238E27FC236}">
+                <a16:creationId xmlns:a16="http://schemas.microsoft.com/office/drawing/2014/main" id="{5A230166-7E7A-32DD-6FC3-CCDAE991EAB7}"/>
+              </a:ext>
+            </a:extLst>
+          </p:cNvPr>
+          <p:cNvSpPr txBox="1"/>
+          <p:nvPr/>
+        </p:nvSpPr>
+        <p:spPr>
+          <a:xfrm>
+            <a:off x="8778658" y="3342362"/>
+            <a:ext cx="1068241" cy="276999"/>
+          </a:xfrm>
+          <a:prstGeom prst="rect">
+            <a:avLst/>
+          </a:prstGeom>
+          <a:noFill/>
+        </p:spPr>
+        <p:txBody>
+          <a:bodyPr wrap="none" rtlCol="0">
+            <a:spAutoFit/>
+          </a:bodyPr>
+          <a:lstStyle/>
+          <a:p>
+            <a:r>
+              <a:rPr lang="en-US" altLang="ko-KR" sz="1200" dirty="0" err="1"/>
+              <a:t>RightBottom</a:t>
+            </a:r>
+            <a:endParaRPr lang="ko-KR" altLang="en-US" sz="1200" dirty="0"/>
+          </a:p>
+        </p:txBody>
+      </p:sp>
+    </p:spTree>
+    <p:extLst>
+      <p:ext uri="{BB962C8B-B14F-4D97-AF65-F5344CB8AC3E}">
+        <p14:creationId xmlns:p14="http://schemas.microsoft.com/office/powerpoint/2010/main" val="2395177610"/>
+      </p:ext>
+    </p:extLst>
+  </p:cSld>
+  <p:clrMapOvr>
+    <a:masterClrMapping/>
+  </p:clrMapOvr>
+</p:sld>
+</file>
+
 <file path=ppt/theme/theme1.xml><?xml version="1.0" encoding="utf-8"?>
 <a:theme xmlns:a="http://schemas.openxmlformats.org/drawingml/2006/main" name="Office 테마">
   <a:themeElements>
@@ -8139,4 +9417,299 @@
     </a:ext>
   </a:extLst>
 </a:theme>
+</file>
+
+<file path=ppt/theme/theme2.xml><?xml version="1.0" encoding="utf-8"?>
+<a:theme xmlns:a="http://schemas.openxmlformats.org/drawingml/2006/main" name="Office 테마">
+  <a:themeElements>
+    <a:clrScheme name="Office">
+      <a:dk1>
+        <a:sysClr val="windowText" lastClr="000000"/>
+      </a:dk1>
+      <a:lt1>
+        <a:sysClr val="window" lastClr="FFFFFF"/>
+      </a:lt1>
+      <a:dk2>
+        <a:srgbClr val="44546A"/>
+      </a:dk2>
+      <a:lt2>
+        <a:srgbClr val="E7E6E6"/>
+      </a:lt2>
+      <a:accent1>
+        <a:srgbClr val="4472C4"/>
+      </a:accent1>
+      <a:accent2>
+        <a:srgbClr val="ED7D31"/>
+      </a:accent2>
+      <a:accent3>
+        <a:srgbClr val="A5A5A5"/>
+      </a:accent3>
+      <a:accent4>
+        <a:srgbClr val="FFC000"/>
+      </a:accent4>
+      <a:accent5>
+        <a:srgbClr val="5B9BD5"/>
+      </a:accent5>
+      <a:accent6>
+        <a:srgbClr val="70AD47"/>
+      </a:accent6>
+      <a:hlink>
+        <a:srgbClr val="0563C1"/>
+      </a:hlink>
+      <a:folHlink>
+        <a:srgbClr val="954F72"/>
+      </a:folHlink>
+    </a:clrScheme>
+    <a:fontScheme name="Office">
+      <a:majorFont>
+        <a:latin typeface="맑은 고딕" panose="020F0302020204030204"/>
+        <a:ea typeface=""/>
+        <a:cs typeface=""/>
+        <a:font script="Jpan" typeface="游ゴシック Light"/>
+        <a:font script="Hang" typeface="맑은 고딕"/>
+        <a:font script="Hans" typeface="等线 Light"/>
+        <a:font script="Hant" typeface="新細明體"/>
+        <a:font script="Arab" typeface="Times New Roman"/>
+        <a:font script="Hebr" typeface="Times New Roman"/>
+        <a:font script="Thai" typeface="Angsana New"/>
+        <a:font script="Ethi" typeface="Nyala"/>
+        <a:font script="Beng" typeface="Vrinda"/>
+        <a:font script="Gujr" typeface="Shruti"/>
+        <a:font script="Khmr" typeface="MoolBoran"/>
+        <a:font script="Knda" typeface="Tunga"/>
+        <a:font script="Guru" typeface="Raavi"/>
+        <a:font script="Cans" typeface="Euphemia"/>
+        <a:font script="Cher" typeface="Plantagenet Cherokee"/>
+        <a:font script="Yiii" typeface="Microsoft Yi Baiti"/>
+        <a:font script="Tibt" typeface="Microsoft Himalaya"/>
+        <a:font script="Thaa" typeface="MV Boli"/>
+        <a:font script="Deva" typeface="Mangal"/>
+        <a:font script="Telu" typeface="Gautami"/>
+        <a:font script="Taml" typeface="Latha"/>
+        <a:font script="Syrc" typeface="Estrangelo Edessa"/>
+        <a:font script="Orya" typeface="Kalinga"/>
+        <a:font script="Mlym" typeface="Kartika"/>
+        <a:font script="Laoo" typeface="DokChampa"/>
+        <a:font script="Sinh" typeface="Iskoola Pota"/>
+        <a:font script="Mong" typeface="Mongolian Baiti"/>
+        <a:font script="Viet" typeface="Times New Roman"/>
+        <a:font script="Uigh" typeface="Microsoft Uighur"/>
+        <a:font script="Geor" typeface="Sylfaen"/>
+        <a:font script="Armn" typeface="Arial"/>
+        <a:font script="Bugi" typeface="Leelawadee UI"/>
+        <a:font script="Bopo" typeface="Microsoft JhengHei"/>
+        <a:font script="Java" typeface="Javanese Text"/>
+        <a:font script="Lisu" typeface="Segoe UI"/>
+        <a:font script="Mymr" typeface="Myanmar Text"/>
+        <a:font script="Nkoo" typeface="Ebrima"/>
+        <a:font script="Olck" typeface="Nirmala UI"/>
+        <a:font script="Osma" typeface="Ebrima"/>
+        <a:font script="Phag" typeface="Phagspa"/>
+        <a:font script="Syrn" typeface="Estrangelo Edessa"/>
+        <a:font script="Syrj" typeface="Estrangelo Edessa"/>
+        <a:font script="Syre" typeface="Estrangelo Edessa"/>
+        <a:font script="Sora" typeface="Nirmala UI"/>
+        <a:font script="Tale" typeface="Microsoft Tai Le"/>
+        <a:font script="Talu" typeface="Microsoft New Tai Lue"/>
+        <a:font script="Tfng" typeface="Ebrima"/>
+      </a:majorFont>
+      <a:minorFont>
+        <a:latin typeface="맑은 고딕" panose="020F0502020204030204"/>
+        <a:ea typeface=""/>
+        <a:cs typeface=""/>
+        <a:font script="Jpan" typeface="游ゴシック"/>
+        <a:font script="Hang" typeface="맑은 고딕"/>
+        <a:font script="Hans" typeface="等线"/>
+        <a:font script="Hant" typeface="新細明體"/>
+        <a:font script="Arab" typeface="Arial"/>
+        <a:font script="Hebr" typeface="Arial"/>
+        <a:font script="Thai" typeface="Cordia New"/>
+        <a:font script="Ethi" typeface="Nyala"/>
+        <a:font script="Beng" typeface="Vrinda"/>
+        <a:font script="Gujr" typeface="Shruti"/>
+        <a:font script="Khmr" typeface="DaunPenh"/>
+        <a:font script="Knda" typeface="Tunga"/>
+        <a:font script="Guru" typeface="Raavi"/>
+        <a:font script="Cans" typeface="Euphemia"/>
+        <a:font script="Cher" typeface="Plantagenet Cherokee"/>
+        <a:font script="Yiii" typeface="Microsoft Yi Baiti"/>
+        <a:font script="Tibt" typeface="Microsoft Himalaya"/>
+        <a:font script="Thaa" typeface="MV Boli"/>
+        <a:font script="Deva" typeface="Mangal"/>
+        <a:font script="Telu" typeface="Gautami"/>
+        <a:font script="Taml" typeface="Latha"/>
+        <a:font script="Syrc" typeface="Estrangelo Edessa"/>
+        <a:font script="Orya" typeface="Kalinga"/>
+        <a:font script="Mlym" typeface="Kartika"/>
+        <a:font script="Laoo" typeface="DokChampa"/>
+        <a:font script="Sinh" typeface="Iskoola Pota"/>
+        <a:font script="Mong" typeface="Mongolian Baiti"/>
+        <a:font script="Viet" typeface="Arial"/>
+        <a:font script="Uigh" typeface="Microsoft Uighur"/>
+        <a:font script="Geor" typeface="Sylfaen"/>
+        <a:font script="Armn" typeface="Arial"/>
+        <a:font script="Bugi" typeface="Leelawadee UI"/>
+        <a:font script="Bopo" typeface="Microsoft JhengHei"/>
+        <a:font script="Java" typeface="Javanese Text"/>
+        <a:font script="Lisu" typeface="Segoe UI"/>
+        <a:font script="Mymr" typeface="Myanmar Text"/>
+        <a:font script="Nkoo" typeface="Ebrima"/>
+        <a:font script="Olck" typeface="Nirmala UI"/>
+        <a:font script="Osma" typeface="Ebrima"/>
+        <a:font script="Phag" typeface="Phagspa"/>
+        <a:font script="Syrn" typeface="Estrangelo Edessa"/>
+        <a:font script="Syrj" typeface="Estrangelo Edessa"/>
+        <a:font script="Syre" typeface="Estrangelo Edessa"/>
+        <a:font script="Sora" typeface="Nirmala UI"/>
+        <a:font script="Tale" typeface="Microsoft Tai Le"/>
+        <a:font script="Talu" typeface="Microsoft New Tai Lue"/>
+        <a:font script="Tfng" typeface="Ebrima"/>
+      </a:minorFont>
+    </a:fontScheme>
+    <a:fmtScheme name="Office">
+      <a:fillStyleLst>
+        <a:solidFill>
+          <a:schemeClr val="phClr"/>
+        </a:solidFill>
+        <a:gradFill rotWithShape="1">
+          <a:gsLst>
+            <a:gs pos="0">
+              <a:schemeClr val="phClr">
+                <a:lumMod val="110000"/>
+                <a:satMod val="105000"/>
+                <a:tint val="67000"/>
+              </a:schemeClr>
+            </a:gs>
+            <a:gs pos="50000">
+              <a:schemeClr val="phClr">
+                <a:lumMod val="105000"/>
+                <a:satMod val="103000"/>
+                <a:tint val="73000"/>
+              </a:schemeClr>
+            </a:gs>
+            <a:gs pos="100000">
+              <a:schemeClr val="phClr">
+                <a:lumMod val="105000"/>
+                <a:satMod val="109000"/>
+                <a:tint val="81000"/>
+              </a:schemeClr>
+            </a:gs>
+          </a:gsLst>
+          <a:lin ang="5400000" scaled="0"/>
+        </a:gradFill>
+        <a:gradFill rotWithShape="1">
+          <a:gsLst>
+            <a:gs pos="0">
+              <a:schemeClr val="phClr">
+                <a:satMod val="103000"/>
+                <a:lumMod val="102000"/>
+                <a:tint val="94000"/>
+              </a:schemeClr>
+            </a:gs>
+            <a:gs pos="50000">
+              <a:schemeClr val="phClr">
+                <a:satMod val="110000"/>
+                <a:lumMod val="100000"/>
+                <a:shade val="100000"/>
+              </a:schemeClr>
+            </a:gs>
+            <a:gs pos="100000">
+              <a:schemeClr val="phClr">
+                <a:lumMod val="99000"/>
+                <a:satMod val="120000"/>
+                <a:shade val="78000"/>
+              </a:schemeClr>
+            </a:gs>
+          </a:gsLst>
+          <a:lin ang="5400000" scaled="0"/>
+        </a:gradFill>
+      </a:fillStyleLst>
+      <a:lnStyleLst>
+        <a:ln w="6350" cap="flat" cmpd="sng" algn="ctr">
+          <a:solidFill>
+            <a:schemeClr val="phClr"/>
+          </a:solidFill>
+          <a:prstDash val="solid"/>
+          <a:miter lim="800000"/>
+        </a:ln>
+        <a:ln w="12700" cap="flat" cmpd="sng" algn="ctr">
+          <a:solidFill>
+            <a:schemeClr val="phClr"/>
+          </a:solidFill>
+          <a:prstDash val="solid"/>
+          <a:miter lim="800000"/>
+        </a:ln>
+        <a:ln w="19050" cap="flat" cmpd="sng" algn="ctr">
+          <a:solidFill>
+            <a:schemeClr val="phClr"/>
+          </a:solidFill>
+          <a:prstDash val="solid"/>
+          <a:miter lim="800000"/>
+        </a:ln>
+      </a:lnStyleLst>
+      <a:effectStyleLst>
+        <a:effectStyle>
+          <a:effectLst/>
+        </a:effectStyle>
+        <a:effectStyle>
+          <a:effectLst/>
+        </a:effectStyle>
+        <a:effectStyle>
+          <a:effectLst>
+            <a:outerShdw blurRad="57150" dist="19050" dir="5400000" algn="ctr" rotWithShape="0">
+              <a:srgbClr val="000000">
+                <a:alpha val="63000"/>
+              </a:srgbClr>
+            </a:outerShdw>
+          </a:effectLst>
+        </a:effectStyle>
+      </a:effectStyleLst>
+      <a:bgFillStyleLst>
+        <a:solidFill>
+          <a:schemeClr val="phClr"/>
+        </a:solidFill>
+        <a:solidFill>
+          <a:schemeClr val="phClr">
+            <a:tint val="95000"/>
+            <a:satMod val="170000"/>
+          </a:schemeClr>
+        </a:solidFill>
+        <a:gradFill rotWithShape="1">
+          <a:gsLst>
+            <a:gs pos="0">
+              <a:schemeClr val="phClr">
+                <a:tint val="93000"/>
+                <a:satMod val="150000"/>
+                <a:shade val="98000"/>
+                <a:lumMod val="102000"/>
+              </a:schemeClr>
+            </a:gs>
+            <a:gs pos="50000">
+              <a:schemeClr val="phClr">
+                <a:tint val="98000"/>
+                <a:satMod val="130000"/>
+                <a:shade val="90000"/>
+                <a:lumMod val="103000"/>
+              </a:schemeClr>
+            </a:gs>
+            <a:gs pos="100000">
+              <a:schemeClr val="phClr">
+                <a:shade val="63000"/>
+                <a:satMod val="120000"/>
+              </a:schemeClr>
+            </a:gs>
+          </a:gsLst>
+          <a:lin ang="5400000" scaled="0"/>
+        </a:gradFill>
+      </a:bgFillStyleLst>
+    </a:fmtScheme>
+  </a:themeElements>
+  <a:objectDefaults/>
+  <a:extraClrSchemeLst/>
+  <a:extLst>
+    <a:ext uri="{05A4C25C-085E-4340-85A3-A5531E510DB2}">
+      <thm15:themeFamily xmlns:thm15="http://schemas.microsoft.com/office/thememl/2012/main" name="Office Theme" id="{62F939B6-93AF-4DB8-9C6B-D6C7DFDC589F}" vid="{4A3C46E8-61CC-4603-A589-7422A47A8E4A}"/>
+    </a:ext>
+  </a:extLst>
+</a:theme>
 </file>
</xml_diff>